<commit_message>
Rächtschribig ond Animation bim Quiz
</commit_message>
<xml_diff>
--- a/Recap/RECAP - Processor Expert & Project Structure.pptx
+++ b/Recap/RECAP - Processor Expert & Project Structure.pptx
@@ -4010,7 +4010,15 @@
             </a:r>
             <a:r>
               <a:rPr lang="de-CH" dirty="0"/>
-              <a:t> Components.</a:t>
+              <a:t> </a:t>
+            </a:r>
+            <a:r>
+              <a:rPr lang="de-CH" dirty="0" err="1"/>
+              <a:t>components</a:t>
+            </a:r>
+            <a:r>
+              <a:rPr lang="de-CH" dirty="0"/>
+              <a:t>.</a:t>
             </a:r>
           </a:p>
           <a:p>
@@ -4192,7 +4200,7 @@
             </a:r>
             <a:r>
               <a:rPr lang="de-CH" dirty="0" err="1"/>
-              <a:t>Component</a:t>
+              <a:t>component</a:t>
             </a:r>
             <a:r>
               <a:rPr lang="de-CH" dirty="0"/>
@@ -4381,7 +4389,7 @@
             </a:r>
             <a:r>
               <a:rPr lang="de-CH" dirty="0" err="1"/>
-              <a:t>Generated</a:t>
+              <a:t>generated</a:t>
             </a:r>
             <a:r>
               <a:rPr lang="de-CH" dirty="0"/>
@@ -4447,11 +4455,11 @@
             </a:r>
             <a:r>
               <a:rPr lang="de-CH" dirty="0" err="1"/>
-              <a:t>Component</a:t>
-            </a:r>
-            <a:r>
-              <a:rPr lang="de-CH" dirty="0"/>
-              <a:t>-Settings in </a:t>
+              <a:t>component</a:t>
+            </a:r>
+            <a:r>
+              <a:rPr lang="de-CH" dirty="0"/>
+              <a:t>-settings in </a:t>
             </a:r>
             <a:r>
               <a:rPr lang="de-CH" dirty="0" err="1"/>
@@ -4747,7 +4755,15 @@
             </a:r>
             <a:r>
               <a:rPr lang="de-CH" dirty="0"/>
-              <a:t> Hardware </a:t>
+              <a:t> </a:t>
+            </a:r>
+            <a:r>
+              <a:rPr lang="de-CH" dirty="0" err="1"/>
+              <a:t>hardware</a:t>
+            </a:r>
+            <a:r>
+              <a:rPr lang="de-CH" dirty="0"/>
+              <a:t> </a:t>
             </a:r>
             <a:r>
               <a:rPr lang="de-CH" dirty="0" err="1"/>
@@ -5761,6 +5777,512 @@
   <p:clrMapOvr>
     <a:masterClrMapping/>
   </p:clrMapOvr>
+  <p:timing>
+    <p:tnLst>
+      <p:par>
+        <p:cTn id="1" dur="indefinite" restart="never" nodeType="tmRoot">
+          <p:childTnLst>
+            <p:seq concurrent="1" nextAc="seek">
+              <p:cTn id="2" dur="indefinite" nodeType="mainSeq">
+                <p:childTnLst>
+                  <p:par>
+                    <p:cTn id="3" fill="hold">
+                      <p:stCondLst>
+                        <p:cond delay="indefinite"/>
+                        <p:cond evt="onBegin" delay="0">
+                          <p:tn val="2"/>
+                        </p:cond>
+                      </p:stCondLst>
+                      <p:childTnLst>
+                        <p:par>
+                          <p:cTn id="4" fill="hold">
+                            <p:stCondLst>
+                              <p:cond delay="0"/>
+                            </p:stCondLst>
+                            <p:childTnLst>
+                              <p:par>
+                                <p:cTn id="5" presetID="10" presetClass="entr" presetSubtype="0" fill="hold" grpId="0" nodeType="withEffect">
+                                  <p:stCondLst>
+                                    <p:cond delay="0"/>
+                                  </p:stCondLst>
+                                  <p:childTnLst>
+                                    <p:set>
+                                      <p:cBhvr>
+                                        <p:cTn id="6" dur="1" fill="hold">
+                                          <p:stCondLst>
+                                            <p:cond delay="0"/>
+                                          </p:stCondLst>
+                                        </p:cTn>
+                                        <p:tgtEl>
+                                          <p:spTgt spid="3">
+                                            <p:txEl>
+                                              <p:pRg st="0" end="0"/>
+                                            </p:txEl>
+                                          </p:spTgt>
+                                        </p:tgtEl>
+                                        <p:attrNameLst>
+                                          <p:attrName>style.visibility</p:attrName>
+                                        </p:attrNameLst>
+                                      </p:cBhvr>
+                                      <p:to>
+                                        <p:strVal val="visible"/>
+                                      </p:to>
+                                    </p:set>
+                                    <p:animEffect transition="in" filter="fade">
+                                      <p:cBhvr>
+                                        <p:cTn id="7" dur="500"/>
+                                        <p:tgtEl>
+                                          <p:spTgt spid="3">
+                                            <p:txEl>
+                                              <p:pRg st="0" end="0"/>
+                                            </p:txEl>
+                                          </p:spTgt>
+                                        </p:tgtEl>
+                                      </p:cBhvr>
+                                    </p:animEffect>
+                                  </p:childTnLst>
+                                </p:cTn>
+                              </p:par>
+                            </p:childTnLst>
+                          </p:cTn>
+                        </p:par>
+                      </p:childTnLst>
+                    </p:cTn>
+                  </p:par>
+                  <p:par>
+                    <p:cTn id="8" fill="hold">
+                      <p:stCondLst>
+                        <p:cond delay="indefinite"/>
+                      </p:stCondLst>
+                      <p:childTnLst>
+                        <p:par>
+                          <p:cTn id="9" fill="hold">
+                            <p:stCondLst>
+                              <p:cond delay="0"/>
+                            </p:stCondLst>
+                            <p:childTnLst>
+                              <p:par>
+                                <p:cTn id="10" presetID="10" presetClass="entr" presetSubtype="0" fill="hold" grpId="0" nodeType="clickEffect">
+                                  <p:stCondLst>
+                                    <p:cond delay="0"/>
+                                  </p:stCondLst>
+                                  <p:childTnLst>
+                                    <p:set>
+                                      <p:cBhvr>
+                                        <p:cTn id="11" dur="1" fill="hold">
+                                          <p:stCondLst>
+                                            <p:cond delay="0"/>
+                                          </p:stCondLst>
+                                        </p:cTn>
+                                        <p:tgtEl>
+                                          <p:spTgt spid="3">
+                                            <p:txEl>
+                                              <p:pRg st="1" end="1"/>
+                                            </p:txEl>
+                                          </p:spTgt>
+                                        </p:tgtEl>
+                                        <p:attrNameLst>
+                                          <p:attrName>style.visibility</p:attrName>
+                                        </p:attrNameLst>
+                                      </p:cBhvr>
+                                      <p:to>
+                                        <p:strVal val="visible"/>
+                                      </p:to>
+                                    </p:set>
+                                    <p:animEffect transition="in" filter="fade">
+                                      <p:cBhvr>
+                                        <p:cTn id="12" dur="500"/>
+                                        <p:tgtEl>
+                                          <p:spTgt spid="3">
+                                            <p:txEl>
+                                              <p:pRg st="1" end="1"/>
+                                            </p:txEl>
+                                          </p:spTgt>
+                                        </p:tgtEl>
+                                      </p:cBhvr>
+                                    </p:animEffect>
+                                  </p:childTnLst>
+                                </p:cTn>
+                              </p:par>
+                              <p:par>
+                                <p:cTn id="13" presetID="10" presetClass="entr" presetSubtype="0" fill="hold" grpId="0" nodeType="withEffect">
+                                  <p:stCondLst>
+                                    <p:cond delay="0"/>
+                                  </p:stCondLst>
+                                  <p:childTnLst>
+                                    <p:set>
+                                      <p:cBhvr>
+                                        <p:cTn id="14" dur="1" fill="hold">
+                                          <p:stCondLst>
+                                            <p:cond delay="0"/>
+                                          </p:stCondLst>
+                                        </p:cTn>
+                                        <p:tgtEl>
+                                          <p:spTgt spid="3">
+                                            <p:txEl>
+                                              <p:pRg st="2" end="2"/>
+                                            </p:txEl>
+                                          </p:spTgt>
+                                        </p:tgtEl>
+                                        <p:attrNameLst>
+                                          <p:attrName>style.visibility</p:attrName>
+                                        </p:attrNameLst>
+                                      </p:cBhvr>
+                                      <p:to>
+                                        <p:strVal val="visible"/>
+                                      </p:to>
+                                    </p:set>
+                                    <p:animEffect transition="in" filter="fade">
+                                      <p:cBhvr>
+                                        <p:cTn id="15" dur="500"/>
+                                        <p:tgtEl>
+                                          <p:spTgt spid="3">
+                                            <p:txEl>
+                                              <p:pRg st="2" end="2"/>
+                                            </p:txEl>
+                                          </p:spTgt>
+                                        </p:tgtEl>
+                                      </p:cBhvr>
+                                    </p:animEffect>
+                                  </p:childTnLst>
+                                </p:cTn>
+                              </p:par>
+                            </p:childTnLst>
+                          </p:cTn>
+                        </p:par>
+                      </p:childTnLst>
+                    </p:cTn>
+                  </p:par>
+                  <p:par>
+                    <p:cTn id="16" fill="hold">
+                      <p:stCondLst>
+                        <p:cond delay="indefinite"/>
+                      </p:stCondLst>
+                      <p:childTnLst>
+                        <p:par>
+                          <p:cTn id="17" fill="hold">
+                            <p:stCondLst>
+                              <p:cond delay="0"/>
+                            </p:stCondLst>
+                            <p:childTnLst>
+                              <p:par>
+                                <p:cTn id="18" presetID="10" presetClass="entr" presetSubtype="0" fill="hold" grpId="0" nodeType="clickEffect">
+                                  <p:stCondLst>
+                                    <p:cond delay="0"/>
+                                  </p:stCondLst>
+                                  <p:childTnLst>
+                                    <p:set>
+                                      <p:cBhvr>
+                                        <p:cTn id="19" dur="1" fill="hold">
+                                          <p:stCondLst>
+                                            <p:cond delay="0"/>
+                                          </p:stCondLst>
+                                        </p:cTn>
+                                        <p:tgtEl>
+                                          <p:spTgt spid="3">
+                                            <p:txEl>
+                                              <p:pRg st="3" end="3"/>
+                                            </p:txEl>
+                                          </p:spTgt>
+                                        </p:tgtEl>
+                                        <p:attrNameLst>
+                                          <p:attrName>style.visibility</p:attrName>
+                                        </p:attrNameLst>
+                                      </p:cBhvr>
+                                      <p:to>
+                                        <p:strVal val="visible"/>
+                                      </p:to>
+                                    </p:set>
+                                    <p:animEffect transition="in" filter="fade">
+                                      <p:cBhvr>
+                                        <p:cTn id="20" dur="500"/>
+                                        <p:tgtEl>
+                                          <p:spTgt spid="3">
+                                            <p:txEl>
+                                              <p:pRg st="3" end="3"/>
+                                            </p:txEl>
+                                          </p:spTgt>
+                                        </p:tgtEl>
+                                      </p:cBhvr>
+                                    </p:animEffect>
+                                  </p:childTnLst>
+                                </p:cTn>
+                              </p:par>
+                            </p:childTnLst>
+                          </p:cTn>
+                        </p:par>
+                      </p:childTnLst>
+                    </p:cTn>
+                  </p:par>
+                  <p:par>
+                    <p:cTn id="21" fill="hold">
+                      <p:stCondLst>
+                        <p:cond delay="indefinite"/>
+                      </p:stCondLst>
+                      <p:childTnLst>
+                        <p:par>
+                          <p:cTn id="22" fill="hold">
+                            <p:stCondLst>
+                              <p:cond delay="0"/>
+                            </p:stCondLst>
+                            <p:childTnLst>
+                              <p:par>
+                                <p:cTn id="23" presetID="10" presetClass="entr" presetSubtype="0" fill="hold" grpId="0" nodeType="clickEffect">
+                                  <p:stCondLst>
+                                    <p:cond delay="0"/>
+                                  </p:stCondLst>
+                                  <p:childTnLst>
+                                    <p:set>
+                                      <p:cBhvr>
+                                        <p:cTn id="24" dur="1" fill="hold">
+                                          <p:stCondLst>
+                                            <p:cond delay="0"/>
+                                          </p:stCondLst>
+                                        </p:cTn>
+                                        <p:tgtEl>
+                                          <p:spTgt spid="3">
+                                            <p:txEl>
+                                              <p:pRg st="4" end="4"/>
+                                            </p:txEl>
+                                          </p:spTgt>
+                                        </p:tgtEl>
+                                        <p:attrNameLst>
+                                          <p:attrName>style.visibility</p:attrName>
+                                        </p:attrNameLst>
+                                      </p:cBhvr>
+                                      <p:to>
+                                        <p:strVal val="visible"/>
+                                      </p:to>
+                                    </p:set>
+                                    <p:animEffect transition="in" filter="fade">
+                                      <p:cBhvr>
+                                        <p:cTn id="25" dur="500"/>
+                                        <p:tgtEl>
+                                          <p:spTgt spid="3">
+                                            <p:txEl>
+                                              <p:pRg st="4" end="4"/>
+                                            </p:txEl>
+                                          </p:spTgt>
+                                        </p:tgtEl>
+                                      </p:cBhvr>
+                                    </p:animEffect>
+                                  </p:childTnLst>
+                                </p:cTn>
+                              </p:par>
+                            </p:childTnLst>
+                          </p:cTn>
+                        </p:par>
+                      </p:childTnLst>
+                    </p:cTn>
+                  </p:par>
+                  <p:par>
+                    <p:cTn id="26" fill="hold">
+                      <p:stCondLst>
+                        <p:cond delay="indefinite"/>
+                      </p:stCondLst>
+                      <p:childTnLst>
+                        <p:par>
+                          <p:cTn id="27" fill="hold">
+                            <p:stCondLst>
+                              <p:cond delay="0"/>
+                            </p:stCondLst>
+                            <p:childTnLst>
+                              <p:par>
+                                <p:cTn id="28" presetID="10" presetClass="entr" presetSubtype="0" fill="hold" grpId="0" nodeType="clickEffect">
+                                  <p:stCondLst>
+                                    <p:cond delay="0"/>
+                                  </p:stCondLst>
+                                  <p:childTnLst>
+                                    <p:set>
+                                      <p:cBhvr>
+                                        <p:cTn id="29" dur="1" fill="hold">
+                                          <p:stCondLst>
+                                            <p:cond delay="0"/>
+                                          </p:stCondLst>
+                                        </p:cTn>
+                                        <p:tgtEl>
+                                          <p:spTgt spid="3">
+                                            <p:txEl>
+                                              <p:pRg st="5" end="5"/>
+                                            </p:txEl>
+                                          </p:spTgt>
+                                        </p:tgtEl>
+                                        <p:attrNameLst>
+                                          <p:attrName>style.visibility</p:attrName>
+                                        </p:attrNameLst>
+                                      </p:cBhvr>
+                                      <p:to>
+                                        <p:strVal val="visible"/>
+                                      </p:to>
+                                    </p:set>
+                                    <p:animEffect transition="in" filter="fade">
+                                      <p:cBhvr>
+                                        <p:cTn id="30" dur="500"/>
+                                        <p:tgtEl>
+                                          <p:spTgt spid="3">
+                                            <p:txEl>
+                                              <p:pRg st="5" end="5"/>
+                                            </p:txEl>
+                                          </p:spTgt>
+                                        </p:tgtEl>
+                                      </p:cBhvr>
+                                    </p:animEffect>
+                                  </p:childTnLst>
+                                </p:cTn>
+                              </p:par>
+                            </p:childTnLst>
+                          </p:cTn>
+                        </p:par>
+                      </p:childTnLst>
+                    </p:cTn>
+                  </p:par>
+                  <p:par>
+                    <p:cTn id="31" fill="hold">
+                      <p:stCondLst>
+                        <p:cond delay="indefinite"/>
+                      </p:stCondLst>
+                      <p:childTnLst>
+                        <p:par>
+                          <p:cTn id="32" fill="hold">
+                            <p:stCondLst>
+                              <p:cond delay="0"/>
+                            </p:stCondLst>
+                            <p:childTnLst>
+                              <p:par>
+                                <p:cTn id="33" presetID="10" presetClass="entr" presetSubtype="0" fill="hold" grpId="0" nodeType="clickEffect">
+                                  <p:stCondLst>
+                                    <p:cond delay="0"/>
+                                  </p:stCondLst>
+                                  <p:childTnLst>
+                                    <p:set>
+                                      <p:cBhvr>
+                                        <p:cTn id="34" dur="1" fill="hold">
+                                          <p:stCondLst>
+                                            <p:cond delay="0"/>
+                                          </p:stCondLst>
+                                        </p:cTn>
+                                        <p:tgtEl>
+                                          <p:spTgt spid="3">
+                                            <p:txEl>
+                                              <p:pRg st="7" end="7"/>
+                                            </p:txEl>
+                                          </p:spTgt>
+                                        </p:tgtEl>
+                                        <p:attrNameLst>
+                                          <p:attrName>style.visibility</p:attrName>
+                                        </p:attrNameLst>
+                                      </p:cBhvr>
+                                      <p:to>
+                                        <p:strVal val="visible"/>
+                                      </p:to>
+                                    </p:set>
+                                    <p:animEffect transition="in" filter="fade">
+                                      <p:cBhvr>
+                                        <p:cTn id="35" dur="500"/>
+                                        <p:tgtEl>
+                                          <p:spTgt spid="3">
+                                            <p:txEl>
+                                              <p:pRg st="7" end="7"/>
+                                            </p:txEl>
+                                          </p:spTgt>
+                                        </p:tgtEl>
+                                      </p:cBhvr>
+                                    </p:animEffect>
+                                  </p:childTnLst>
+                                </p:cTn>
+                              </p:par>
+                            </p:childTnLst>
+                          </p:cTn>
+                        </p:par>
+                      </p:childTnLst>
+                    </p:cTn>
+                  </p:par>
+                  <p:par>
+                    <p:cTn id="36" fill="hold">
+                      <p:stCondLst>
+                        <p:cond delay="indefinite"/>
+                      </p:stCondLst>
+                      <p:childTnLst>
+                        <p:par>
+                          <p:cTn id="37" fill="hold">
+                            <p:stCondLst>
+                              <p:cond delay="0"/>
+                            </p:stCondLst>
+                            <p:childTnLst>
+                              <p:par>
+                                <p:cTn id="38" presetID="10" presetClass="entr" presetSubtype="0" fill="hold" grpId="0" nodeType="clickEffect">
+                                  <p:stCondLst>
+                                    <p:cond delay="0"/>
+                                  </p:stCondLst>
+                                  <p:childTnLst>
+                                    <p:set>
+                                      <p:cBhvr>
+                                        <p:cTn id="39" dur="1" fill="hold">
+                                          <p:stCondLst>
+                                            <p:cond delay="0"/>
+                                          </p:stCondLst>
+                                        </p:cTn>
+                                        <p:tgtEl>
+                                          <p:spTgt spid="3">
+                                            <p:txEl>
+                                              <p:pRg st="8" end="8"/>
+                                            </p:txEl>
+                                          </p:spTgt>
+                                        </p:tgtEl>
+                                        <p:attrNameLst>
+                                          <p:attrName>style.visibility</p:attrName>
+                                        </p:attrNameLst>
+                                      </p:cBhvr>
+                                      <p:to>
+                                        <p:strVal val="visible"/>
+                                      </p:to>
+                                    </p:set>
+                                    <p:animEffect transition="in" filter="fade">
+                                      <p:cBhvr>
+                                        <p:cTn id="40" dur="500"/>
+                                        <p:tgtEl>
+                                          <p:spTgt spid="3">
+                                            <p:txEl>
+                                              <p:pRg st="8" end="8"/>
+                                            </p:txEl>
+                                          </p:spTgt>
+                                        </p:tgtEl>
+                                      </p:cBhvr>
+                                    </p:animEffect>
+                                  </p:childTnLst>
+                                </p:cTn>
+                              </p:par>
+                            </p:childTnLst>
+                          </p:cTn>
+                        </p:par>
+                      </p:childTnLst>
+                    </p:cTn>
+                  </p:par>
+                </p:childTnLst>
+              </p:cTn>
+              <p:prevCondLst>
+                <p:cond evt="onPrev" delay="0">
+                  <p:tgtEl>
+                    <p:sldTgt/>
+                  </p:tgtEl>
+                </p:cond>
+              </p:prevCondLst>
+              <p:nextCondLst>
+                <p:cond evt="onNext" delay="0">
+                  <p:tgtEl>
+                    <p:sldTgt/>
+                  </p:tgtEl>
+                </p:cond>
+              </p:nextCondLst>
+            </p:seq>
+          </p:childTnLst>
+        </p:cTn>
+      </p:par>
+    </p:tnLst>
+    <p:bldLst>
+      <p:bldP spid="3" grpId="0" uiExpand="1" build="p"/>
+    </p:bldLst>
+  </p:timing>
 </p:sld>
 </file>
 

</xml_diff>